<commit_message>
Adding Clustering Model descriptions to the README.
</commit_message>
<xml_diff>
--- a/Clustering_Model_mockup.pptx
+++ b/Clustering_Model_mockup.pptx
@@ -278,7 +278,7 @@
           <a:p>
             <a:fld id="{FB976BD0-6C01-4959-BC7B-4DCD2E7A8811}" type="datetimeFigureOut">
               <a:rPr lang="es-MX" smtClean="0"/>
-              <a:t>13/02/2022</a:t>
+              <a:t>26/02/2022</a:t>
             </a:fld>
             <a:endParaRPr lang="es-MX"/>
           </a:p>
@@ -332,7 +332,7 @@
           <a:p>
             <a:fld id="{F64559AA-DEBF-42B4-9856-6E28DC35C178}" type="slidenum">
               <a:rPr lang="es-MX" smtClean="0"/>
-              <a:t>‹#›</a:t>
+              <a:t>‹Nº›</a:t>
             </a:fld>
             <a:endParaRPr lang="es-MX"/>
           </a:p>
@@ -478,7 +478,7 @@
           <a:p>
             <a:fld id="{FB976BD0-6C01-4959-BC7B-4DCD2E7A8811}" type="datetimeFigureOut">
               <a:rPr lang="es-MX" smtClean="0"/>
-              <a:t>13/02/2022</a:t>
+              <a:t>26/02/2022</a:t>
             </a:fld>
             <a:endParaRPr lang="es-MX"/>
           </a:p>
@@ -532,7 +532,7 @@
           <a:p>
             <a:fld id="{F64559AA-DEBF-42B4-9856-6E28DC35C178}" type="slidenum">
               <a:rPr lang="es-MX" smtClean="0"/>
-              <a:t>‹#›</a:t>
+              <a:t>‹Nº›</a:t>
             </a:fld>
             <a:endParaRPr lang="es-MX"/>
           </a:p>
@@ -688,7 +688,7 @@
           <a:p>
             <a:fld id="{FB976BD0-6C01-4959-BC7B-4DCD2E7A8811}" type="datetimeFigureOut">
               <a:rPr lang="es-MX" smtClean="0"/>
-              <a:t>13/02/2022</a:t>
+              <a:t>26/02/2022</a:t>
             </a:fld>
             <a:endParaRPr lang="es-MX"/>
           </a:p>
@@ -742,7 +742,7 @@
           <a:p>
             <a:fld id="{F64559AA-DEBF-42B4-9856-6E28DC35C178}" type="slidenum">
               <a:rPr lang="es-MX" smtClean="0"/>
-              <a:t>‹#›</a:t>
+              <a:t>‹Nº›</a:t>
             </a:fld>
             <a:endParaRPr lang="es-MX"/>
           </a:p>
@@ -888,7 +888,7 @@
           <a:p>
             <a:fld id="{FB976BD0-6C01-4959-BC7B-4DCD2E7A8811}" type="datetimeFigureOut">
               <a:rPr lang="es-MX" smtClean="0"/>
-              <a:t>13/02/2022</a:t>
+              <a:t>26/02/2022</a:t>
             </a:fld>
             <a:endParaRPr lang="es-MX"/>
           </a:p>
@@ -942,7 +942,7 @@
           <a:p>
             <a:fld id="{F64559AA-DEBF-42B4-9856-6E28DC35C178}" type="slidenum">
               <a:rPr lang="es-MX" smtClean="0"/>
-              <a:t>‹#›</a:t>
+              <a:t>‹Nº›</a:t>
             </a:fld>
             <a:endParaRPr lang="es-MX"/>
           </a:p>
@@ -1164,7 +1164,7 @@
           <a:p>
             <a:fld id="{FB976BD0-6C01-4959-BC7B-4DCD2E7A8811}" type="datetimeFigureOut">
               <a:rPr lang="es-MX" smtClean="0"/>
-              <a:t>13/02/2022</a:t>
+              <a:t>26/02/2022</a:t>
             </a:fld>
             <a:endParaRPr lang="es-MX"/>
           </a:p>
@@ -1218,7 +1218,7 @@
           <a:p>
             <a:fld id="{F64559AA-DEBF-42B4-9856-6E28DC35C178}" type="slidenum">
               <a:rPr lang="es-MX" smtClean="0"/>
-              <a:t>‹#›</a:t>
+              <a:t>‹Nº›</a:t>
             </a:fld>
             <a:endParaRPr lang="es-MX"/>
           </a:p>
@@ -1432,7 +1432,7 @@
           <a:p>
             <a:fld id="{FB976BD0-6C01-4959-BC7B-4DCD2E7A8811}" type="datetimeFigureOut">
               <a:rPr lang="es-MX" smtClean="0"/>
-              <a:t>13/02/2022</a:t>
+              <a:t>26/02/2022</a:t>
             </a:fld>
             <a:endParaRPr lang="es-MX"/>
           </a:p>
@@ -1486,7 +1486,7 @@
           <a:p>
             <a:fld id="{F64559AA-DEBF-42B4-9856-6E28DC35C178}" type="slidenum">
               <a:rPr lang="es-MX" smtClean="0"/>
-              <a:t>‹#›</a:t>
+              <a:t>‹Nº›</a:t>
             </a:fld>
             <a:endParaRPr lang="es-MX"/>
           </a:p>
@@ -1847,7 +1847,7 @@
           <a:p>
             <a:fld id="{FB976BD0-6C01-4959-BC7B-4DCD2E7A8811}" type="datetimeFigureOut">
               <a:rPr lang="es-MX" smtClean="0"/>
-              <a:t>13/02/2022</a:t>
+              <a:t>26/02/2022</a:t>
             </a:fld>
             <a:endParaRPr lang="es-MX"/>
           </a:p>
@@ -1901,7 +1901,7 @@
           <a:p>
             <a:fld id="{F64559AA-DEBF-42B4-9856-6E28DC35C178}" type="slidenum">
               <a:rPr lang="es-MX" smtClean="0"/>
-              <a:t>‹#›</a:t>
+              <a:t>‹Nº›</a:t>
             </a:fld>
             <a:endParaRPr lang="es-MX"/>
           </a:p>
@@ -1989,7 +1989,7 @@
           <a:p>
             <a:fld id="{FB976BD0-6C01-4959-BC7B-4DCD2E7A8811}" type="datetimeFigureOut">
               <a:rPr lang="es-MX" smtClean="0"/>
-              <a:t>13/02/2022</a:t>
+              <a:t>26/02/2022</a:t>
             </a:fld>
             <a:endParaRPr lang="es-MX"/>
           </a:p>
@@ -2043,7 +2043,7 @@
           <a:p>
             <a:fld id="{F64559AA-DEBF-42B4-9856-6E28DC35C178}" type="slidenum">
               <a:rPr lang="es-MX" smtClean="0"/>
-              <a:t>‹#›</a:t>
+              <a:t>‹Nº›</a:t>
             </a:fld>
             <a:endParaRPr lang="es-MX"/>
           </a:p>
@@ -2102,7 +2102,7 @@
           <a:p>
             <a:fld id="{FB976BD0-6C01-4959-BC7B-4DCD2E7A8811}" type="datetimeFigureOut">
               <a:rPr lang="es-MX" smtClean="0"/>
-              <a:t>13/02/2022</a:t>
+              <a:t>26/02/2022</a:t>
             </a:fld>
             <a:endParaRPr lang="es-MX"/>
           </a:p>
@@ -2156,7 +2156,7 @@
           <a:p>
             <a:fld id="{F64559AA-DEBF-42B4-9856-6E28DC35C178}" type="slidenum">
               <a:rPr lang="es-MX" smtClean="0"/>
-              <a:t>‹#›</a:t>
+              <a:t>‹Nº›</a:t>
             </a:fld>
             <a:endParaRPr lang="es-MX"/>
           </a:p>
@@ -2415,7 +2415,7 @@
           <a:p>
             <a:fld id="{FB976BD0-6C01-4959-BC7B-4DCD2E7A8811}" type="datetimeFigureOut">
               <a:rPr lang="es-MX" smtClean="0"/>
-              <a:t>13/02/2022</a:t>
+              <a:t>26/02/2022</a:t>
             </a:fld>
             <a:endParaRPr lang="es-MX"/>
           </a:p>
@@ -2469,7 +2469,7 @@
           <a:p>
             <a:fld id="{F64559AA-DEBF-42B4-9856-6E28DC35C178}" type="slidenum">
               <a:rPr lang="es-MX" smtClean="0"/>
-              <a:t>‹#›</a:t>
+              <a:t>‹Nº›</a:t>
             </a:fld>
             <a:endParaRPr lang="es-MX"/>
           </a:p>
@@ -2704,7 +2704,7 @@
           <a:p>
             <a:fld id="{FB976BD0-6C01-4959-BC7B-4DCD2E7A8811}" type="datetimeFigureOut">
               <a:rPr lang="es-MX" smtClean="0"/>
-              <a:t>13/02/2022</a:t>
+              <a:t>26/02/2022</a:t>
             </a:fld>
             <a:endParaRPr lang="es-MX"/>
           </a:p>
@@ -2758,7 +2758,7 @@
           <a:p>
             <a:fld id="{F64559AA-DEBF-42B4-9856-6E28DC35C178}" type="slidenum">
               <a:rPr lang="es-MX" smtClean="0"/>
-              <a:t>‹#›</a:t>
+              <a:t>‹Nº›</a:t>
             </a:fld>
             <a:endParaRPr lang="es-MX"/>
           </a:p>
@@ -2947,7 +2947,7 @@
           <a:p>
             <a:fld id="{FB976BD0-6C01-4959-BC7B-4DCD2E7A8811}" type="datetimeFigureOut">
               <a:rPr lang="es-MX" smtClean="0"/>
-              <a:t>13/02/2022</a:t>
+              <a:t>26/02/2022</a:t>
             </a:fld>
             <a:endParaRPr lang="es-MX"/>
           </a:p>
@@ -3037,7 +3037,7 @@
           <a:p>
             <a:fld id="{F64559AA-DEBF-42B4-9856-6E28DC35C178}" type="slidenum">
               <a:rPr lang="es-MX" smtClean="0"/>
-              <a:t>‹#›</a:t>
+              <a:t>‹Nº›</a:t>
             </a:fld>
             <a:endParaRPr lang="es-MX"/>
           </a:p>
@@ -3591,7 +3591,7 @@
                   <a:srgbClr val="0070C0"/>
                 </a:solidFill>
               </a:rPr>
-              <a:t>Clustering Roadmap &amp; Mockup</a:t>
+              <a:t>Clustering Model Roadmap</a:t>
             </a:r>
           </a:p>
         </p:txBody>
@@ -3610,8 +3610,8 @@
         </p:nvSpPr>
         <p:spPr>
           <a:xfrm>
-            <a:off x="1410872" y="2934045"/>
-            <a:ext cx="1744598" cy="1222870"/>
+            <a:off x="1410872" y="3132828"/>
+            <a:ext cx="1744598" cy="1200329"/>
           </a:xfrm>
           <a:prstGeom prst="rect">
             <a:avLst/>
@@ -3630,17 +3630,17 @@
             </a:r>
             <a:r>
               <a:rPr lang="en-US" dirty="0"/>
-              <a:t>dataset with 6K rows and 116 features.</a:t>
-            </a:r>
-          </a:p>
-        </p:txBody>
-      </p:sp>
-      <p:sp>
-        <p:nvSpPr>
-          <p:cNvPr id="8" name="Rectángulo: esquinas redondeadas 7">
-            <a:extLst>
-              <a:ext uri="{FF2B5EF4-FFF2-40B4-BE49-F238E27FC236}">
-                <a16:creationId xmlns:a16="http://schemas.microsoft.com/office/drawing/2014/main" id="{85A6CA2D-C4B3-4CC4-A6C5-BD0CC12F3320}"/>
+              <a:t>dataset with 5.3K and 88 features.</a:t>
+            </a:r>
+          </a:p>
+        </p:txBody>
+      </p:sp>
+      <p:sp>
+        <p:nvSpPr>
+          <p:cNvPr id="11" name="Rectángulo: esquinas redondeadas 10">
+            <a:extLst>
+              <a:ext uri="{FF2B5EF4-FFF2-40B4-BE49-F238E27FC236}">
+                <a16:creationId xmlns:a16="http://schemas.microsoft.com/office/drawing/2014/main" id="{5FD5CA7A-1F49-4302-963A-3692901499A8}"/>
               </a:ext>
             </a:extLst>
           </p:cNvPr>
@@ -3649,120 +3649,7 @@
         </p:nvSpPr>
         <p:spPr>
           <a:xfrm>
-            <a:off x="3571023" y="3807702"/>
-            <a:ext cx="2409782" cy="1471021"/>
-          </a:xfrm>
-          <a:prstGeom prst="roundRect">
-            <a:avLst/>
-          </a:prstGeom>
-          <a:noFill/>
-          <a:ln>
-            <a:noFill/>
-          </a:ln>
-          <a:effectLst/>
-        </p:spPr>
-        <p:style>
-          <a:lnRef idx="2">
-            <a:schemeClr val="accent1">
-              <a:shade val="50000"/>
-            </a:schemeClr>
-          </a:lnRef>
-          <a:fillRef idx="1">
-            <a:schemeClr val="accent1"/>
-          </a:fillRef>
-          <a:effectRef idx="0">
-            <a:schemeClr val="accent1"/>
-          </a:effectRef>
-          <a:fontRef idx="minor">
-            <a:schemeClr val="lt1"/>
-          </a:fontRef>
-        </p:style>
-        <p:txBody>
-          <a:bodyPr rtlCol="0" anchor="t"/>
-          <a:lstStyle/>
-          <a:p>
-            <a:r>
-              <a:rPr lang="en-US" sz="1400" b="1" dirty="0">
-                <a:solidFill>
-                  <a:schemeClr val="tx1"/>
-                </a:solidFill>
-              </a:rPr>
-              <a:t>Data cleaning:</a:t>
-            </a:r>
-          </a:p>
-          <a:p>
-            <a:pPr marL="285750" indent="-285750">
-              <a:buFontTx/>
-              <a:buChar char="-"/>
-            </a:pPr>
-            <a:r>
-              <a:rPr lang="en-US" sz="1400" dirty="0">
-                <a:solidFill>
-                  <a:schemeClr val="tx1"/>
-                </a:solidFill>
-              </a:rPr>
-              <a:t>Non COVID scenarios.</a:t>
-            </a:r>
-          </a:p>
-          <a:p>
-            <a:pPr marL="285750" indent="-285750">
-              <a:buFontTx/>
-              <a:buChar char="-"/>
-            </a:pPr>
-            <a:r>
-              <a:rPr lang="en-US" sz="1400" dirty="0">
-                <a:solidFill>
-                  <a:schemeClr val="tx1"/>
-                </a:solidFill>
-              </a:rPr>
-              <a:t>Nearly empty rows.</a:t>
-            </a:r>
-          </a:p>
-          <a:p>
-            <a:pPr marL="285750" indent="-285750">
-              <a:buFontTx/>
-              <a:buChar char="-"/>
-            </a:pPr>
-            <a:r>
-              <a:rPr lang="en-US" sz="1400" dirty="0">
-                <a:solidFill>
-                  <a:schemeClr val="tx1"/>
-                </a:solidFill>
-              </a:rPr>
-              <a:t>Non relevant features.</a:t>
-            </a:r>
-          </a:p>
-          <a:p>
-            <a:pPr marL="285750" indent="-285750">
-              <a:buFontTx/>
-              <a:buChar char="-"/>
-            </a:pPr>
-            <a:r>
-              <a:rPr lang="en-US" sz="1400" dirty="0">
-                <a:solidFill>
-                  <a:schemeClr val="tx1"/>
-                </a:solidFill>
-              </a:rPr>
-              <a:t>Filling null values, etc.</a:t>
-            </a:r>
-          </a:p>
-        </p:txBody>
-      </p:sp>
-      <p:sp>
-        <p:nvSpPr>
-          <p:cNvPr id="11" name="Rectángulo: esquinas redondeadas 10">
-            <a:extLst>
-              <a:ext uri="{FF2B5EF4-FFF2-40B4-BE49-F238E27FC236}">
-                <a16:creationId xmlns:a16="http://schemas.microsoft.com/office/drawing/2014/main" id="{5FD5CA7A-1F49-4302-963A-3692901499A8}"/>
-              </a:ext>
-            </a:extLst>
-          </p:cNvPr>
-          <p:cNvSpPr/>
-          <p:nvPr/>
-        </p:nvSpPr>
-        <p:spPr>
-          <a:xfrm>
-            <a:off x="3621259" y="2934045"/>
+            <a:off x="3621259" y="3132828"/>
             <a:ext cx="1913206" cy="831453"/>
           </a:xfrm>
           <a:prstGeom prst="roundRect">
@@ -3820,54 +3707,19 @@
       </p:sp>
       <p:sp>
         <p:nvSpPr>
-          <p:cNvPr id="12" name="CuadroTexto 11">
-            <a:extLst>
-              <a:ext uri="{FF2B5EF4-FFF2-40B4-BE49-F238E27FC236}">
-                <a16:creationId xmlns:a16="http://schemas.microsoft.com/office/drawing/2014/main" id="{CD51D583-ACE5-4E0B-A388-04630C2931AE}"/>
-              </a:ext>
-            </a:extLst>
-          </p:cNvPr>
-          <p:cNvSpPr txBox="1"/>
+          <p:cNvPr id="17" name="Flecha: pentágono 16">
+            <a:extLst>
+              <a:ext uri="{FF2B5EF4-FFF2-40B4-BE49-F238E27FC236}">
+                <a16:creationId xmlns:a16="http://schemas.microsoft.com/office/drawing/2014/main" id="{4CA94C0F-E3CF-42A9-AD63-DFF733ED44C0}"/>
+              </a:ext>
+            </a:extLst>
+          </p:cNvPr>
+          <p:cNvSpPr/>
           <p:nvPr/>
         </p:nvSpPr>
         <p:spPr>
           <a:xfrm>
-            <a:off x="6194476" y="3909373"/>
-            <a:ext cx="1913206" cy="523220"/>
-          </a:xfrm>
-          <a:prstGeom prst="rect">
-            <a:avLst/>
-          </a:prstGeom>
-          <a:noFill/>
-        </p:spPr>
-        <p:txBody>
-          <a:bodyPr wrap="square" rtlCol="0">
-            <a:spAutoFit/>
-          </a:bodyPr>
-          <a:lstStyle/>
-          <a:p>
-            <a:r>
-              <a:rPr lang="en-US" sz="1400" dirty="0"/>
-              <a:t>Decreasing features and defining clusters. </a:t>
-            </a:r>
-          </a:p>
-        </p:txBody>
-      </p:sp>
-      <p:sp>
-        <p:nvSpPr>
-          <p:cNvPr id="17" name="Flecha: pentágono 16">
-            <a:extLst>
-              <a:ext uri="{FF2B5EF4-FFF2-40B4-BE49-F238E27FC236}">
-                <a16:creationId xmlns:a16="http://schemas.microsoft.com/office/drawing/2014/main" id="{4CA94C0F-E3CF-42A9-AD63-DFF733ED44C0}"/>
-              </a:ext>
-            </a:extLst>
-          </p:cNvPr>
-          <p:cNvSpPr/>
-          <p:nvPr/>
-        </p:nvSpPr>
-        <p:spPr>
-          <a:xfrm>
-            <a:off x="980660" y="1998735"/>
+            <a:off x="980660" y="1654178"/>
             <a:ext cx="10090614" cy="684022"/>
           </a:xfrm>
           <a:prstGeom prst="homePlate">
@@ -3923,7 +3775,7 @@
         </p:nvSpPr>
         <p:spPr>
           <a:xfrm>
-            <a:off x="1037595" y="1998735"/>
+            <a:off x="1037595" y="1654178"/>
             <a:ext cx="7359748" cy="684022"/>
           </a:xfrm>
           <a:prstGeom prst="homePlate">
@@ -3974,7 +3826,7 @@
         </p:nvSpPr>
         <p:spPr>
           <a:xfrm>
-            <a:off x="945084" y="1998735"/>
+            <a:off x="945084" y="1654178"/>
             <a:ext cx="4921144" cy="684022"/>
           </a:xfrm>
           <a:prstGeom prst="homePlate">
@@ -4031,7 +3883,7 @@
         </p:nvSpPr>
         <p:spPr>
           <a:xfrm>
-            <a:off x="945084" y="1998735"/>
+            <a:off x="945084" y="1654178"/>
             <a:ext cx="2676175" cy="684022"/>
           </a:xfrm>
           <a:prstGeom prst="homePlate">
@@ -4088,7 +3940,7 @@
         </p:nvSpPr>
         <p:spPr>
           <a:xfrm>
-            <a:off x="1430215" y="2109914"/>
+            <a:off x="1430215" y="1765357"/>
             <a:ext cx="1744598" cy="461665"/>
           </a:xfrm>
           <a:prstGeom prst="rect">
@@ -4123,7 +3975,7 @@
         </p:nvSpPr>
         <p:spPr>
           <a:xfrm>
-            <a:off x="3920679" y="2109914"/>
+            <a:off x="3920679" y="1765357"/>
             <a:ext cx="1744598" cy="461665"/>
           </a:xfrm>
           <a:prstGeom prst="rect">
@@ -4158,7 +4010,7 @@
         </p:nvSpPr>
         <p:spPr>
           <a:xfrm>
-            <a:off x="6011592" y="2109914"/>
+            <a:off x="6011592" y="1765357"/>
             <a:ext cx="2301444" cy="461665"/>
           </a:xfrm>
           <a:prstGeom prst="rect">
@@ -4197,7 +4049,7 @@
         </p:nvSpPr>
         <p:spPr>
           <a:xfrm>
-            <a:off x="8775896" y="2109914"/>
+            <a:off x="8775896" y="1765357"/>
             <a:ext cx="2126566" cy="461665"/>
           </a:xfrm>
           <a:prstGeom prst="rect">
@@ -4236,7 +4088,7 @@
         </p:nvSpPr>
         <p:spPr>
           <a:xfrm>
-            <a:off x="6058179" y="2934045"/>
+            <a:off x="6058179" y="3132828"/>
             <a:ext cx="1913206" cy="831453"/>
           </a:xfrm>
           <a:prstGeom prst="roundRect">
@@ -4317,8 +4169,8 @@
         </p:nvSpPr>
         <p:spPr>
           <a:xfrm>
-            <a:off x="8466963" y="2934045"/>
-            <a:ext cx="1913206" cy="1303657"/>
+            <a:off x="8466963" y="3132828"/>
+            <a:ext cx="1913206" cy="1386973"/>
           </a:xfrm>
           <a:prstGeom prst="roundRect">
             <a:avLst/>
@@ -4358,7 +4210,7 @@
           </a:fontRef>
         </p:style>
         <p:txBody>
-          <a:bodyPr rtlCol="0" anchor="ctr"/>
+          <a:bodyPr rtlCol="0" anchor="t"/>
           <a:lstStyle/>
           <a:p>
             <a:pPr algn="ctr"/>
@@ -4379,7 +4231,7 @@
                   <a:schemeClr val="tx1"/>
                 </a:solidFill>
               </a:rPr>
-              <a:t>+Data Analytics</a:t>
+              <a:t>+Visualization</a:t>
             </a:r>
           </a:p>
           <a:p>
@@ -4390,7 +4242,178 @@
                   <a:schemeClr val="tx1"/>
                 </a:solidFill>
               </a:rPr>
-              <a:t>+Visualization</a:t>
+              <a:t>+Logistic Regression</a:t>
+            </a:r>
+          </a:p>
+        </p:txBody>
+      </p:sp>
+      <p:sp>
+        <p:nvSpPr>
+          <p:cNvPr id="27" name="CuadroTexto 26">
+            <a:extLst>
+              <a:ext uri="{FF2B5EF4-FFF2-40B4-BE49-F238E27FC236}">
+                <a16:creationId xmlns:a16="http://schemas.microsoft.com/office/drawing/2014/main" id="{B9F62C82-3180-4901-8BAD-4BF35074DD9C}"/>
+              </a:ext>
+            </a:extLst>
+          </p:cNvPr>
+          <p:cNvSpPr txBox="1"/>
+          <p:nvPr/>
+        </p:nvSpPr>
+        <p:spPr>
+          <a:xfrm>
+            <a:off x="1350703" y="2351885"/>
+            <a:ext cx="1744598" cy="646331"/>
+          </a:xfrm>
+          <a:prstGeom prst="rect">
+            <a:avLst/>
+          </a:prstGeom>
+          <a:noFill/>
+        </p:spPr>
+        <p:txBody>
+          <a:bodyPr wrap="square" rtlCol="0" anchor="t">
+            <a:spAutoFit/>
+          </a:bodyPr>
+          <a:lstStyle/>
+          <a:p>
+            <a:pPr algn="ctr"/>
+            <a:r>
+              <a:rPr lang="en-US" dirty="0">
+                <a:solidFill>
+                  <a:srgbClr val="0070C0"/>
+                </a:solidFill>
+              </a:rPr>
+              <a:t>PostgreSQL</a:t>
+            </a:r>
+          </a:p>
+          <a:p>
+            <a:pPr algn="ctr"/>
+            <a:r>
+              <a:rPr lang="en-US" dirty="0">
+                <a:solidFill>
+                  <a:srgbClr val="0070C0"/>
+                </a:solidFill>
+              </a:rPr>
+              <a:t>&amp; SQL Alchemy</a:t>
+            </a:r>
+          </a:p>
+        </p:txBody>
+      </p:sp>
+      <p:sp>
+        <p:nvSpPr>
+          <p:cNvPr id="29" name="CuadroTexto 28">
+            <a:extLst>
+              <a:ext uri="{FF2B5EF4-FFF2-40B4-BE49-F238E27FC236}">
+                <a16:creationId xmlns:a16="http://schemas.microsoft.com/office/drawing/2014/main" id="{D08521B9-4F35-406C-86B2-F9B3A2360759}"/>
+              </a:ext>
+            </a:extLst>
+          </p:cNvPr>
+          <p:cNvSpPr txBox="1"/>
+          <p:nvPr/>
+        </p:nvSpPr>
+        <p:spPr>
+          <a:xfrm>
+            <a:off x="3789867" y="2351885"/>
+            <a:ext cx="1744598" cy="646331"/>
+          </a:xfrm>
+          <a:prstGeom prst="rect">
+            <a:avLst/>
+          </a:prstGeom>
+          <a:noFill/>
+        </p:spPr>
+        <p:txBody>
+          <a:bodyPr wrap="square" rtlCol="0" anchor="t">
+            <a:spAutoFit/>
+          </a:bodyPr>
+          <a:lstStyle/>
+          <a:p>
+            <a:pPr algn="ctr"/>
+            <a:r>
+              <a:rPr lang="en-US" dirty="0">
+                <a:solidFill>
+                  <a:srgbClr val="0070C0"/>
+                </a:solidFill>
+              </a:rPr>
+              <a:t>Python Pandas &amp; sklearn </a:t>
+            </a:r>
+          </a:p>
+        </p:txBody>
+      </p:sp>
+      <p:sp>
+        <p:nvSpPr>
+          <p:cNvPr id="30" name="CuadroTexto 29">
+            <a:extLst>
+              <a:ext uri="{FF2B5EF4-FFF2-40B4-BE49-F238E27FC236}">
+                <a16:creationId xmlns:a16="http://schemas.microsoft.com/office/drawing/2014/main" id="{2E470323-9802-4F4F-AA01-A7FEC12D1064}"/>
+              </a:ext>
+            </a:extLst>
+          </p:cNvPr>
+          <p:cNvSpPr txBox="1"/>
+          <p:nvPr/>
+        </p:nvSpPr>
+        <p:spPr>
+          <a:xfrm>
+            <a:off x="6142483" y="2351885"/>
+            <a:ext cx="1744598" cy="646331"/>
+          </a:xfrm>
+          <a:prstGeom prst="rect">
+            <a:avLst/>
+          </a:prstGeom>
+          <a:noFill/>
+        </p:spPr>
+        <p:txBody>
+          <a:bodyPr wrap="square" rtlCol="0" anchor="t">
+            <a:spAutoFit/>
+          </a:bodyPr>
+          <a:lstStyle/>
+          <a:p>
+            <a:pPr algn="ctr"/>
+            <a:r>
+              <a:rPr lang="en-US" dirty="0">
+                <a:solidFill>
+                  <a:srgbClr val="0070C0"/>
+                </a:solidFill>
+              </a:rPr>
+              <a:t>Python Pandas &amp; sklearn</a:t>
+            </a:r>
+          </a:p>
+        </p:txBody>
+      </p:sp>
+      <p:sp>
+        <p:nvSpPr>
+          <p:cNvPr id="31" name="CuadroTexto 30">
+            <a:extLst>
+              <a:ext uri="{FF2B5EF4-FFF2-40B4-BE49-F238E27FC236}">
+                <a16:creationId xmlns:a16="http://schemas.microsoft.com/office/drawing/2014/main" id="{63911337-B614-49E3-95CB-83E7C7D9E6A9}"/>
+              </a:ext>
+            </a:extLst>
+          </p:cNvPr>
+          <p:cNvSpPr txBox="1"/>
+          <p:nvPr/>
+        </p:nvSpPr>
+        <p:spPr>
+          <a:xfrm>
+            <a:off x="8738939" y="2351885"/>
+            <a:ext cx="1744598" cy="369332"/>
+          </a:xfrm>
+          <a:prstGeom prst="rect">
+            <a:avLst/>
+          </a:prstGeom>
+          <a:noFill/>
+        </p:spPr>
+        <p:txBody>
+          <a:bodyPr wrap="square" rtlCol="0" anchor="t">
+            <a:spAutoFit/>
+          </a:bodyPr>
+          <a:lstStyle/>
+          <a:p>
+            <a:pPr algn="ctr"/>
+            <a:r>
+              <a:rPr lang="en-US" dirty="0">
+                <a:solidFill>
+                  <a:srgbClr val="0070C0"/>
+                </a:solidFill>
+              </a:rPr>
+              <a:t>Python plotly</a:t>
             </a:r>
           </a:p>
         </p:txBody>

</xml_diff>